<commit_message>
added an additional slide on implementing error recovery
</commit_message>
<xml_diff>
--- a/PowerPoint Slides/07 - Error Handling.pptx
+++ b/PowerPoint Slides/07 - Error Handling.pptx
@@ -5,10 +5,10 @@
     <p:sldMasterId id="2147483651" r:id="rId1"/>
   </p:sldMasterIdLst>
   <p:notesMasterIdLst>
-    <p:notesMasterId r:id="rId24"/>
+    <p:notesMasterId r:id="rId25"/>
   </p:notesMasterIdLst>
   <p:handoutMasterIdLst>
-    <p:handoutMasterId r:id="rId25"/>
+    <p:handoutMasterId r:id="rId26"/>
   </p:handoutMasterIdLst>
   <p:sldIdLst>
     <p:sldId id="256" r:id="rId2"/>
@@ -30,9 +30,10 @@
     <p:sldId id="297" r:id="rId18"/>
     <p:sldId id="294" r:id="rId19"/>
     <p:sldId id="285" r:id="rId20"/>
-    <p:sldId id="290" r:id="rId21"/>
-    <p:sldId id="292" r:id="rId22"/>
-    <p:sldId id="291" r:id="rId23"/>
+    <p:sldId id="350" r:id="rId21"/>
+    <p:sldId id="290" r:id="rId22"/>
+    <p:sldId id="292" r:id="rId23"/>
+    <p:sldId id="291" r:id="rId24"/>
   </p:sldIdLst>
   <p:sldSz cx="9144000" cy="6858000" type="screen4x3"/>
   <p:notesSz cx="7010400" cy="9296400"/>
@@ -1981,19 +1982,21 @@
       </p:grpSpPr>
       <p:sp>
         <p:nvSpPr>
-          <p:cNvPr id="2" name="Slide Image Placeholder 1"/>
-          <p:cNvSpPr>
-            <a:spLocks noGrp="1" noRot="1" noChangeAspect="1"/>
+          <p:cNvPr id="25602" name="Slide Image Placeholder 1"/>
+          <p:cNvSpPr>
+            <a:spLocks noGrp="1" noRot="1" noChangeAspect="1" noTextEdit="1"/>
           </p:cNvSpPr>
           <p:nvPr>
             <p:ph type="sldImg"/>
           </p:nvPr>
         </p:nvSpPr>
-        <p:spPr/>
-      </p:sp>
-      <p:sp>
-        <p:nvSpPr>
-          <p:cNvPr id="3" name="Notes Placeholder 2"/>
+        <p:spPr>
+          <a:ln/>
+        </p:spPr>
+      </p:sp>
+      <p:sp>
+        <p:nvSpPr>
+          <p:cNvPr id="25603" name="Notes Placeholder 2"/>
           <p:cNvSpPr>
             <a:spLocks noGrp="1"/>
           </p:cNvSpPr>
@@ -2001,11 +2004,12 @@
             <p:ph type="body" idx="1"/>
           </p:nvPr>
         </p:nvSpPr>
-        <p:spPr/>
-        <p:txBody>
-          <a:bodyPr>
-            <a:normAutofit/>
-          </a:bodyPr>
+        <p:spPr>
+          <a:noFill/>
+          <a:ln/>
+        </p:spPr>
+        <p:txBody>
+          <a:bodyPr/>
           <a:lstStyle/>
           <a:p>
             <a:endParaRPr lang="en-US"/>
@@ -2014,22 +2018,21 @@
       </p:sp>
       <p:sp>
         <p:nvSpPr>
-          <p:cNvPr id="4" name="Header Placeholder 3"/>
+          <p:cNvPr id="25604" name="Header Placeholder 3"/>
           <p:cNvSpPr>
             <a:spLocks noGrp="1"/>
           </p:cNvSpPr>
           <p:nvPr>
-            <p:ph type="hdr" sz="quarter" idx="10"/>
-          </p:nvPr>
-        </p:nvSpPr>
-        <p:spPr/>
-        <p:txBody>
-          <a:bodyPr/>
-          <a:lstStyle/>
-          <a:p>
-            <a:pPr>
-              <a:defRPr/>
-            </a:pPr>
+            <p:ph type="hdr" sz="quarter"/>
+          </p:nvPr>
+        </p:nvSpPr>
+        <p:spPr>
+          <a:noFill/>
+        </p:spPr>
+        <p:txBody>
+          <a:bodyPr/>
+          <a:lstStyle/>
+          <a:p>
             <a:r>
               <a:rPr lang="en-US"/>
               <a:t>Error Handling/Recovery</a:t>
@@ -2039,27 +2042,24 @@
       </p:sp>
       <p:sp>
         <p:nvSpPr>
-          <p:cNvPr id="5" name="Slide Number Placeholder 4"/>
+          <p:cNvPr id="25605" name="Slide Number Placeholder 4"/>
           <p:cNvSpPr>
             <a:spLocks noGrp="1"/>
           </p:cNvSpPr>
           <p:nvPr>
-            <p:ph type="sldNum" sz="quarter" idx="11"/>
-          </p:nvPr>
-        </p:nvSpPr>
-        <p:spPr/>
-        <p:txBody>
-          <a:bodyPr/>
-          <a:lstStyle/>
-          <a:p>
-            <a:pPr>
-              <a:defRPr/>
-            </a:pPr>
-            <a:fld id="{2BFD5EC9-8BB5-4004-863A-6F8E90CF6E11}" type="slidenum">
+            <p:ph type="sldNum" sz="quarter" idx="5"/>
+          </p:nvPr>
+        </p:nvSpPr>
+        <p:spPr>
+          <a:noFill/>
+        </p:spPr>
+        <p:txBody>
+          <a:bodyPr/>
+          <a:lstStyle/>
+          <a:p>
+            <a:fld id="{74B7879F-EF9E-4F76-84F9-353033F1FA96}" type="slidenum">
               <a:rPr lang="en-US" smtClean="0"/>
-              <a:pPr>
-                <a:defRPr/>
-              </a:pPr>
+              <a:pPr/>
               <a:t>20</a:t>
             </a:fld>
             <a:endParaRPr lang="en-US"/>
@@ -2069,7 +2069,7 @@
     </p:spTree>
     <p:extLst>
       <p:ext uri="{BB962C8B-B14F-4D97-AF65-F5344CB8AC3E}">
-        <p14:creationId xmlns:p14="http://schemas.microsoft.com/office/powerpoint/2010/main" val="4032950668"/>
+        <p14:creationId xmlns:p14="http://schemas.microsoft.com/office/powerpoint/2010/main" val="3311149288"/>
       </p:ext>
     </p:extLst>
   </p:cSld>
@@ -2302,7 +2302,7 @@
     </p:spTree>
     <p:extLst>
       <p:ext uri="{BB962C8B-B14F-4D97-AF65-F5344CB8AC3E}">
-        <p14:creationId xmlns:p14="http://schemas.microsoft.com/office/powerpoint/2010/main" val="788038621"/>
+        <p14:creationId xmlns:p14="http://schemas.microsoft.com/office/powerpoint/2010/main" val="4032950668"/>
       </p:ext>
     </p:extLst>
   </p:cSld>
@@ -2411,6 +2411,123 @@
                 <a:defRPr/>
               </a:pPr>
               <a:t>22</a:t>
+            </a:fld>
+            <a:endParaRPr lang="en-US"/>
+          </a:p>
+        </p:txBody>
+      </p:sp>
+    </p:spTree>
+    <p:extLst>
+      <p:ext uri="{BB962C8B-B14F-4D97-AF65-F5344CB8AC3E}">
+        <p14:creationId xmlns:p14="http://schemas.microsoft.com/office/powerpoint/2010/main" val="788038621"/>
+      </p:ext>
+    </p:extLst>
+  </p:cSld>
+  <p:clrMapOvr>
+    <a:masterClrMapping/>
+  </p:clrMapOvr>
+</p:notes>
+</file>
+
+<file path=ppt/notesSlides/notesSlide22.xml><?xml version="1.0" encoding="utf-8"?>
+<p:notes xmlns:a="http://schemas.openxmlformats.org/drawingml/2006/main" xmlns:r="http://schemas.openxmlformats.org/officeDocument/2006/relationships" xmlns:p="http://schemas.openxmlformats.org/presentationml/2006/main">
+  <p:cSld>
+    <p:spTree>
+      <p:nvGrpSpPr>
+        <p:cNvPr id="1" name=""/>
+        <p:cNvGrpSpPr/>
+        <p:nvPr/>
+      </p:nvGrpSpPr>
+      <p:grpSpPr>
+        <a:xfrm>
+          <a:off x="0" y="0"/>
+          <a:ext cx="0" cy="0"/>
+          <a:chOff x="0" y="0"/>
+          <a:chExt cx="0" cy="0"/>
+        </a:xfrm>
+      </p:grpSpPr>
+      <p:sp>
+        <p:nvSpPr>
+          <p:cNvPr id="2" name="Slide Image Placeholder 1"/>
+          <p:cNvSpPr>
+            <a:spLocks noGrp="1" noRot="1" noChangeAspect="1"/>
+          </p:cNvSpPr>
+          <p:nvPr>
+            <p:ph type="sldImg"/>
+          </p:nvPr>
+        </p:nvSpPr>
+        <p:spPr/>
+      </p:sp>
+      <p:sp>
+        <p:nvSpPr>
+          <p:cNvPr id="3" name="Notes Placeholder 2"/>
+          <p:cNvSpPr>
+            <a:spLocks noGrp="1"/>
+          </p:cNvSpPr>
+          <p:nvPr>
+            <p:ph type="body" idx="1"/>
+          </p:nvPr>
+        </p:nvSpPr>
+        <p:spPr/>
+        <p:txBody>
+          <a:bodyPr>
+            <a:normAutofit/>
+          </a:bodyPr>
+          <a:lstStyle/>
+          <a:p>
+            <a:endParaRPr lang="en-US"/>
+          </a:p>
+        </p:txBody>
+      </p:sp>
+      <p:sp>
+        <p:nvSpPr>
+          <p:cNvPr id="4" name="Header Placeholder 3"/>
+          <p:cNvSpPr>
+            <a:spLocks noGrp="1"/>
+          </p:cNvSpPr>
+          <p:nvPr>
+            <p:ph type="hdr" sz="quarter" idx="10"/>
+          </p:nvPr>
+        </p:nvSpPr>
+        <p:spPr/>
+        <p:txBody>
+          <a:bodyPr/>
+          <a:lstStyle/>
+          <a:p>
+            <a:pPr>
+              <a:defRPr/>
+            </a:pPr>
+            <a:r>
+              <a:rPr lang="en-US"/>
+              <a:t>Error Handling/Recovery</a:t>
+            </a:r>
+          </a:p>
+        </p:txBody>
+      </p:sp>
+      <p:sp>
+        <p:nvSpPr>
+          <p:cNvPr id="5" name="Slide Number Placeholder 4"/>
+          <p:cNvSpPr>
+            <a:spLocks noGrp="1"/>
+          </p:cNvSpPr>
+          <p:nvPr>
+            <p:ph type="sldNum" sz="quarter" idx="11"/>
+          </p:nvPr>
+        </p:nvSpPr>
+        <p:spPr/>
+        <p:txBody>
+          <a:bodyPr/>
+          <a:lstStyle/>
+          <a:p>
+            <a:pPr>
+              <a:defRPr/>
+            </a:pPr>
+            <a:fld id="{2BFD5EC9-8BB5-4004-863A-6F8E90CF6E11}" type="slidenum">
+              <a:rPr lang="en-US" smtClean="0"/>
+              <a:pPr>
+                <a:defRPr/>
+              </a:pPr>
+              <a:t>23</a:t>
             </a:fld>
             <a:endParaRPr lang="en-US"/>
           </a:p>
@@ -8428,7 +8545,7 @@
       </p:grpSpPr>
       <p:sp>
         <p:nvSpPr>
-          <p:cNvPr id="2" name="Title 1"/>
+          <p:cNvPr id="12290" name="Title 1"/>
           <p:cNvSpPr>
             <a:spLocks noGrp="1"/>
           </p:cNvSpPr>
@@ -8443,14 +8560,22 @@
           <a:p>
             <a:r>
               <a:rPr lang="en-US" dirty="0"/>
-              <a:t>Additional Error Recovery Strategies</a:t>
-            </a:r>
-          </a:p>
-        </p:txBody>
-      </p:sp>
-      <p:sp>
-        <p:nvSpPr>
-          <p:cNvPr id="3" name="Content Placeholder 2"/>
+              <a:t>Implementing Error Recovery</a:t>
+            </a:r>
+            <a:br>
+              <a:rPr lang="en-US" dirty="0"/>
+            </a:br>
+            <a:r>
+              <a:rPr lang="en-US" sz="2400" dirty="0"/>
+              <a:t>(continued)</a:t>
+            </a:r>
+            <a:endParaRPr lang="en-US" dirty="0"/>
+          </a:p>
+        </p:txBody>
+      </p:sp>
+      <p:sp>
+        <p:nvSpPr>
+          <p:cNvPr id="12291" name="Content Placeholder 2"/>
           <p:cNvSpPr>
             <a:spLocks noGrp="1"/>
           </p:cNvSpPr>
@@ -8458,85 +8583,75 @@
             <p:ph idx="1"/>
           </p:nvPr>
         </p:nvSpPr>
-        <p:spPr/>
-        <p:txBody>
-          <a:bodyPr/>
-          <a:lstStyle/>
-          <a:p>
-            <a:r>
-              <a:rPr lang="en-US" dirty="0"/>
-              <a:t>After reporting the error, replace the token with one that might be allowed at that point in the parsing process.</a:t>
-            </a:r>
-          </a:p>
-          <a:p>
-            <a:r>
-              <a:rPr lang="en-US" dirty="0"/>
-              <a:t>Examples</a:t>
-            </a:r>
-          </a:p>
-          <a:p>
-            <a:pPr lvl="1"/>
-            <a:r>
-              <a:rPr lang="en-US" dirty="0"/>
-              <a:t>Replace “</a:t>
+        <p:spPr>
+          <a:xfrm>
+            <a:off x="458787" y="1363663"/>
+            <a:ext cx="8229600" cy="4935537"/>
+          </a:xfrm>
+        </p:spPr>
+        <p:txBody>
+          <a:bodyPr/>
+          <a:lstStyle/>
+          <a:p>
+            <a:r>
+              <a:rPr lang="en-US" dirty="0"/>
+              <a:t>Additionally, method </a:t>
+            </a:r>
+            <a:r>
+              <a:rPr lang="en-US" dirty="0" err="1">
+                <a:latin typeface="Consolas" panose="020B0609020204030204" pitchFamily="49" charset="0"/>
+              </a:rPr>
+              <a:t>parseVariableExpr</a:t>
             </a:r>
             <a:r>
               <a:rPr lang="en-US" dirty="0">
-                <a:latin typeface="Consolas" pitchFamily="49" charset="0"/>
-                <a:cs typeface="Consolas" pitchFamily="49" charset="0"/>
-              </a:rPr>
-              <a:t>=</a:t>
-            </a:r>
-            <a:r>
-              <a:rPr lang="en-US" dirty="0"/>
-              <a:t>” by “</a:t>
+                <a:latin typeface="Consolas" panose="020B0609020204030204" pitchFamily="49" charset="0"/>
+              </a:rPr>
+              <a:t>()</a:t>
+            </a:r>
+            <a:r>
+              <a:rPr lang="en-US" dirty="0"/>
+              <a:t> and the </a:t>
             </a:r>
             <a:r>
               <a:rPr lang="en-US" dirty="0">
-                <a:latin typeface="Consolas" pitchFamily="49" charset="0"/>
-                <a:cs typeface="Consolas" pitchFamily="49" charset="0"/>
-              </a:rPr>
-              <a:t>:=</a:t>
-            </a:r>
-            <a:r>
-              <a:rPr lang="en-US" dirty="0"/>
-              <a:t>” when parsing an assignment statement in a CPRL compiler.</a:t>
-            </a:r>
-          </a:p>
-          <a:p>
-            <a:pPr lvl="1"/>
-            <a:r>
-              <a:rPr lang="en-US" dirty="0"/>
-              <a:t>Replace “</a:t>
-            </a:r>
-            <a:r>
-              <a:rPr lang="en-US" dirty="0">
-                <a:latin typeface="Consolas" pitchFamily="49" charset="0"/>
-                <a:cs typeface="Consolas" pitchFamily="49" charset="0"/>
-              </a:rPr>
-              <a:t>=</a:t>
-            </a:r>
-            <a:r>
-              <a:rPr lang="en-US" dirty="0"/>
-              <a:t>” by “</a:t>
-            </a:r>
-            <a:r>
-              <a:rPr lang="en-US" dirty="0">
-                <a:latin typeface="Consolas" pitchFamily="49" charset="0"/>
-                <a:cs typeface="Consolas" pitchFamily="49" charset="0"/>
-              </a:rPr>
-              <a:t>==</a:t>
-            </a:r>
-            <a:r>
-              <a:rPr lang="en-US" dirty="0"/>
-              <a:t>” when expecting a relational operator in a Java compiler.</a:t>
-            </a:r>
-          </a:p>
-        </p:txBody>
-      </p:sp>
-      <p:sp>
-        <p:nvSpPr>
-          <p:cNvPr id="4" name="Footer Placeholder 3"/>
+                <a:latin typeface="Consolas" panose="020B0609020204030204" pitchFamily="49" charset="0"/>
+              </a:rPr>
+              <a:t>add()</a:t>
+            </a:r>
+            <a:r>
+              <a:rPr lang="en-US" dirty="0"/>
+              <a:t> method of class </a:t>
+            </a:r>
+            <a:r>
+              <a:rPr lang="en-US" dirty="0" err="1">
+                <a:latin typeface="Consolas" panose="020B0609020204030204" pitchFamily="49" charset="0"/>
+              </a:rPr>
+              <a:t>IdTable</a:t>
+            </a:r>
+            <a:r>
+              <a:rPr lang="en-US" dirty="0"/>
+              <a:t> can throw a </a:t>
+            </a:r>
+            <a:r>
+              <a:rPr lang="en-US" dirty="0" err="1">
+                <a:latin typeface="Consolas" panose="020B0609020204030204" pitchFamily="49" charset="0"/>
+              </a:rPr>
+              <a:t>ParserException</a:t>
+            </a:r>
+            <a:r>
+              <a:rPr lang="en-US" dirty="0"/>
+              <a:t>.</a:t>
+            </a:r>
+          </a:p>
+          <a:p>
+            <a:endParaRPr lang="en-US" dirty="0"/>
+          </a:p>
+        </p:txBody>
+      </p:sp>
+      <p:sp>
+        <p:nvSpPr>
+          <p:cNvPr id="12292" name="Footer Placeholder 3"/>
           <p:cNvSpPr>
             <a:spLocks noGrp="1"/>
           </p:cNvSpPr>
@@ -8544,14 +8659,13 @@
             <p:ph type="ftr" sz="quarter" idx="10"/>
           </p:nvPr>
         </p:nvSpPr>
-        <p:spPr/>
-        <p:txBody>
-          <a:bodyPr/>
-          <a:lstStyle/>
-          <a:p>
-            <a:pPr>
-              <a:defRPr/>
-            </a:pPr>
+        <p:spPr>
+          <a:noFill/>
+        </p:spPr>
+        <p:txBody>
+          <a:bodyPr/>
+          <a:lstStyle/>
+          <a:p>
             <a:r>
               <a:rPr lang="en-US"/>
               <a:t>©SoftMoore Consulting</a:t>
@@ -8561,7 +8675,7 @@
       </p:sp>
       <p:sp>
         <p:nvSpPr>
-          <p:cNvPr id="5" name="Slide Number Placeholder 4"/>
+          <p:cNvPr id="12293" name="Slide Number Placeholder 4"/>
           <p:cNvSpPr>
             <a:spLocks noGrp="1"/>
           </p:cNvSpPr>
@@ -8569,30 +8683,133 @@
             <p:ph type="sldNum" sz="quarter" idx="11"/>
           </p:nvPr>
         </p:nvSpPr>
-        <p:spPr/>
-        <p:txBody>
-          <a:bodyPr/>
-          <a:lstStyle/>
-          <a:p>
-            <a:pPr>
-              <a:defRPr/>
-            </a:pPr>
+        <p:spPr>
+          <a:noFill/>
+        </p:spPr>
+        <p:txBody>
+          <a:bodyPr/>
+          <a:lstStyle/>
+          <a:p>
             <a:r>
               <a:rPr lang="en-US"/>
               <a:t>Slide </a:t>
             </a:r>
-            <a:fld id="{5F271557-76C1-4390-9827-E45E8E4E29D5}" type="slidenum">
+            <a:fld id="{BA05502E-EC74-4E63-800A-7EC72E27E9CC}" type="slidenum">
               <a:rPr lang="en-US" smtClean="0"/>
-              <a:pPr>
-                <a:defRPr/>
-              </a:pPr>
+              <a:pPr/>
               <a:t>20</a:t>
             </a:fld>
             <a:endParaRPr lang="en-US"/>
           </a:p>
         </p:txBody>
       </p:sp>
+      <p:sp>
+        <p:nvSpPr>
+          <p:cNvPr id="3" name="TextBox 2">
+            <a:extLst>
+              <a:ext uri="{FF2B5EF4-FFF2-40B4-BE49-F238E27FC236}">
+                <a16:creationId xmlns:a16="http://schemas.microsoft.com/office/drawing/2014/main" id="{FDDC2DD0-C332-4D10-BB79-F240AA53A3B1}"/>
+              </a:ext>
+            </a:extLst>
+          </p:cNvPr>
+          <p:cNvSpPr txBox="1"/>
+          <p:nvPr/>
+        </p:nvSpPr>
+        <p:spPr>
+          <a:xfrm>
+            <a:off x="685800" y="3048000"/>
+            <a:ext cx="7772400" cy="1569660"/>
+          </a:xfrm>
+          <a:prstGeom prst="rect">
+            <a:avLst/>
+          </a:prstGeom>
+          <a:noFill/>
+          <a:ln>
+            <a:solidFill>
+              <a:schemeClr val="tx1"/>
+            </a:solidFill>
+          </a:ln>
+        </p:spPr>
+        <p:txBody>
+          <a:bodyPr wrap="none" rtlCol="0">
+            <a:spAutoFit/>
+          </a:bodyPr>
+          <a:lstStyle/>
+          <a:p>
+            <a:pPr algn="l"/>
+            <a:r>
+              <a:rPr lang="en-US" dirty="0">
+                <a:latin typeface="Consolas" panose="020B0609020204030204" pitchFamily="49" charset="0"/>
+              </a:rPr>
+              <a:t>match()</a:t>
+            </a:r>
+            <a:r>
+              <a:rPr lang="en-US" dirty="0"/>
+              <a:t>, </a:t>
+            </a:r>
+            <a:r>
+              <a:rPr lang="en-US" dirty="0">
+                <a:latin typeface="Consolas" panose="020B0609020204030204" pitchFamily="49" charset="0"/>
+              </a:rPr>
+              <a:t>add()</a:t>
+            </a:r>
+            <a:r>
+              <a:rPr lang="en-US" dirty="0"/>
+              <a:t>, and </a:t>
+            </a:r>
+            <a:r>
+              <a:rPr lang="en-US" dirty="0" err="1">
+                <a:latin typeface="Consolas" panose="020B0609020204030204" pitchFamily="49" charset="0"/>
+              </a:rPr>
+              <a:t>parseVariableExpr</a:t>
+            </a:r>
+            <a:r>
+              <a:rPr lang="en-US" dirty="0">
+                <a:latin typeface="Consolas" panose="020B0609020204030204" pitchFamily="49" charset="0"/>
+              </a:rPr>
+              <a:t>()</a:t>
+            </a:r>
+            <a:r>
+              <a:rPr lang="en-US" dirty="0"/>
+              <a:t> are the</a:t>
+            </a:r>
+          </a:p>
+          <a:p>
+            <a:pPr algn="l"/>
+            <a:r>
+              <a:rPr lang="en-US" dirty="0"/>
+              <a:t>only three methods that throw a </a:t>
+            </a:r>
+            <a:r>
+              <a:rPr lang="en-US" dirty="0" err="1">
+                <a:latin typeface="Consolas" panose="020B0609020204030204" pitchFamily="49" charset="0"/>
+              </a:rPr>
+              <a:t>ParserException</a:t>
+            </a:r>
+            <a:endParaRPr lang="en-US" dirty="0"/>
+          </a:p>
+          <a:p>
+            <a:pPr algn="l"/>
+            <a:r>
+              <a:rPr lang="en-US" dirty="0"/>
+              <a:t>back to the caller, so any method that calls one of</a:t>
+            </a:r>
+          </a:p>
+          <a:p>
+            <a:pPr algn="l"/>
+            <a:r>
+              <a:rPr lang="en-US" dirty="0"/>
+              <a:t>these three methods will need to have a try/catch block.</a:t>
+            </a:r>
+          </a:p>
+        </p:txBody>
+      </p:sp>
     </p:spTree>
+    <p:extLst>
+      <p:ext uri="{BB962C8B-B14F-4D97-AF65-F5344CB8AC3E}">
+        <p14:creationId xmlns:p14="http://schemas.microsoft.com/office/powerpoint/2010/main" val="2189464222"/>
+      </p:ext>
+    </p:extLst>
   </p:cSld>
   <p:clrMapOvr>
     <a:masterClrMapping/>
@@ -8636,13 +8853,6 @@
               <a:rPr lang="en-US" dirty="0"/>
               <a:t>Additional Error Recovery Strategies</a:t>
             </a:r>
-            <a:br>
-              <a:rPr lang="en-US" dirty="0"/>
-            </a:br>
-            <a:r>
-              <a:rPr lang="en-US" sz="2400" dirty="0"/>
-              <a:t>(continued)</a:t>
-            </a:r>
           </a:p>
         </p:txBody>
       </p:sp>
@@ -8663,7 +8873,7 @@
           <a:p>
             <a:r>
               <a:rPr lang="en-US" dirty="0"/>
-              <a:t>After reporting the error, insert a new token in front of the one that generated the error.</a:t>
+              <a:t>After reporting the error, replace the token with one that might be allowed at that point in the parsing process.</a:t>
             </a:r>
           </a:p>
           <a:p>
@@ -8676,80 +8886,58 @@
             <a:pPr lvl="1"/>
             <a:r>
               <a:rPr lang="en-US" dirty="0"/>
-              <a:t>When parsing an exit statement, after matching “</a:t>
+              <a:t>Replace “</a:t>
             </a:r>
             <a:r>
               <a:rPr lang="en-US" dirty="0">
                 <a:latin typeface="Consolas" pitchFamily="49" charset="0"/>
                 <a:cs typeface="Consolas" pitchFamily="49" charset="0"/>
               </a:rPr>
-              <a:t>exit</a:t>
-            </a:r>
-            <a:r>
-              <a:rPr lang="en-US" dirty="0"/>
-              <a:t>”, if the symbol encountered is in the first set of expression, insert “</a:t>
+              <a:t>=</a:t>
+            </a:r>
+            <a:r>
+              <a:rPr lang="en-US" dirty="0"/>
+              <a:t>” by “</a:t>
             </a:r>
             <a:r>
               <a:rPr lang="en-US" dirty="0">
                 <a:latin typeface="Consolas" pitchFamily="49" charset="0"/>
                 <a:cs typeface="Consolas" pitchFamily="49" charset="0"/>
               </a:rPr>
-              <a:t>when</a:t>
-            </a:r>
-            <a:r>
-              <a:rPr lang="en-US" dirty="0"/>
-              <a:t>” and continue parsing.</a:t>
+              <a:t>:=</a:t>
+            </a:r>
+            <a:r>
+              <a:rPr lang="en-US" dirty="0"/>
+              <a:t>” when parsing an assignment statement in a CPRL compiler.</a:t>
             </a:r>
           </a:p>
           <a:p>
             <a:pPr lvl="1"/>
             <a:r>
               <a:rPr lang="en-US" dirty="0"/>
-              <a:t>When parsing an expression, if “</a:t>
+              <a:t>Replace “</a:t>
             </a:r>
             <a:r>
               <a:rPr lang="en-US" dirty="0">
                 <a:latin typeface="Consolas" pitchFamily="49" charset="0"/>
                 <a:cs typeface="Consolas" pitchFamily="49" charset="0"/>
               </a:rPr>
-              <a:t>)</a:t>
-            </a:r>
-            <a:r>
-              <a:rPr lang="en-US" dirty="0"/>
-              <a:t>” is expected but “</a:t>
+              <a:t>=</a:t>
+            </a:r>
+            <a:r>
+              <a:rPr lang="en-US" dirty="0"/>
+              <a:t>” by “</a:t>
             </a:r>
             <a:r>
               <a:rPr lang="en-US" dirty="0">
                 <a:latin typeface="Consolas" pitchFamily="49" charset="0"/>
                 <a:cs typeface="Consolas" pitchFamily="49" charset="0"/>
               </a:rPr>
-              <a:t>;</a:t>
-            </a:r>
-            <a:r>
-              <a:rPr lang="en-US" dirty="0"/>
-              <a:t>” is encountered as the next symbol, insert “</a:t>
-            </a:r>
-            <a:r>
-              <a:rPr lang="en-US" dirty="0">
-                <a:latin typeface="Consolas" pitchFamily="49" charset="0"/>
-                <a:cs typeface="Consolas" pitchFamily="49" charset="0"/>
-              </a:rPr>
-              <a:t>)</a:t>
-            </a:r>
-            <a:r>
-              <a:rPr lang="en-US" dirty="0"/>
-              <a:t>” with the expectation that the “</a:t>
-            </a:r>
-            <a:r>
-              <a:rPr lang="en-US" dirty="0">
-                <a:latin typeface="Consolas" pitchFamily="49" charset="0"/>
-                <a:cs typeface="Consolas" pitchFamily="49" charset="0"/>
-              </a:rPr>
-              <a:t>;</a:t>
-            </a:r>
-            <a:r>
-              <a:rPr lang="en-US" dirty="0"/>
-              <a:t>” will likely terminate a statement.</a:t>
+              <a:t>==</a:t>
+            </a:r>
+            <a:r>
+              <a:rPr lang="en-US" dirty="0"/>
+              <a:t>” when expecting a relational operator in a Java compiler.</a:t>
             </a:r>
           </a:p>
         </p:txBody>
@@ -8854,6 +9042,226 @@
           <a:p>
             <a:r>
               <a:rPr lang="en-US" dirty="0"/>
+              <a:t>Additional Error Recovery Strategies</a:t>
+            </a:r>
+            <a:br>
+              <a:rPr lang="en-US" dirty="0"/>
+            </a:br>
+            <a:r>
+              <a:rPr lang="en-US" sz="2400" dirty="0"/>
+              <a:t>(continued)</a:t>
+            </a:r>
+          </a:p>
+        </p:txBody>
+      </p:sp>
+      <p:sp>
+        <p:nvSpPr>
+          <p:cNvPr id="3" name="Content Placeholder 2"/>
+          <p:cNvSpPr>
+            <a:spLocks noGrp="1"/>
+          </p:cNvSpPr>
+          <p:nvPr>
+            <p:ph idx="1"/>
+          </p:nvPr>
+        </p:nvSpPr>
+        <p:spPr/>
+        <p:txBody>
+          <a:bodyPr/>
+          <a:lstStyle/>
+          <a:p>
+            <a:r>
+              <a:rPr lang="en-US" dirty="0"/>
+              <a:t>After reporting the error, insert a new token in front of the one that generated the error.</a:t>
+            </a:r>
+          </a:p>
+          <a:p>
+            <a:r>
+              <a:rPr lang="en-US" dirty="0"/>
+              <a:t>Examples</a:t>
+            </a:r>
+          </a:p>
+          <a:p>
+            <a:pPr lvl="1"/>
+            <a:r>
+              <a:rPr lang="en-US" dirty="0"/>
+              <a:t>When parsing an exit statement, after matching “</a:t>
+            </a:r>
+            <a:r>
+              <a:rPr lang="en-US" dirty="0">
+                <a:latin typeface="Consolas" pitchFamily="49" charset="0"/>
+                <a:cs typeface="Consolas" pitchFamily="49" charset="0"/>
+              </a:rPr>
+              <a:t>exit</a:t>
+            </a:r>
+            <a:r>
+              <a:rPr lang="en-US" dirty="0"/>
+              <a:t>”, if the symbol encountered is in the first set of expression, insert “</a:t>
+            </a:r>
+            <a:r>
+              <a:rPr lang="en-US" dirty="0">
+                <a:latin typeface="Consolas" pitchFamily="49" charset="0"/>
+                <a:cs typeface="Consolas" pitchFamily="49" charset="0"/>
+              </a:rPr>
+              <a:t>when</a:t>
+            </a:r>
+            <a:r>
+              <a:rPr lang="en-US" dirty="0"/>
+              <a:t>” and continue parsing.</a:t>
+            </a:r>
+          </a:p>
+          <a:p>
+            <a:pPr lvl="1"/>
+            <a:r>
+              <a:rPr lang="en-US" dirty="0"/>
+              <a:t>When parsing an expression, if “</a:t>
+            </a:r>
+            <a:r>
+              <a:rPr lang="en-US" dirty="0">
+                <a:latin typeface="Consolas" pitchFamily="49" charset="0"/>
+                <a:cs typeface="Consolas" pitchFamily="49" charset="0"/>
+              </a:rPr>
+              <a:t>)</a:t>
+            </a:r>
+            <a:r>
+              <a:rPr lang="en-US" dirty="0"/>
+              <a:t>” is expected but “</a:t>
+            </a:r>
+            <a:r>
+              <a:rPr lang="en-US" dirty="0">
+                <a:latin typeface="Consolas" pitchFamily="49" charset="0"/>
+                <a:cs typeface="Consolas" pitchFamily="49" charset="0"/>
+              </a:rPr>
+              <a:t>;</a:t>
+            </a:r>
+            <a:r>
+              <a:rPr lang="en-US" dirty="0"/>
+              <a:t>” is encountered as the next symbol, insert “</a:t>
+            </a:r>
+            <a:r>
+              <a:rPr lang="en-US" dirty="0">
+                <a:latin typeface="Consolas" pitchFamily="49" charset="0"/>
+                <a:cs typeface="Consolas" pitchFamily="49" charset="0"/>
+              </a:rPr>
+              <a:t>)</a:t>
+            </a:r>
+            <a:r>
+              <a:rPr lang="en-US" dirty="0"/>
+              <a:t>” with the expectation that the “</a:t>
+            </a:r>
+            <a:r>
+              <a:rPr lang="en-US" dirty="0">
+                <a:latin typeface="Consolas" pitchFamily="49" charset="0"/>
+                <a:cs typeface="Consolas" pitchFamily="49" charset="0"/>
+              </a:rPr>
+              <a:t>;</a:t>
+            </a:r>
+            <a:r>
+              <a:rPr lang="en-US" dirty="0"/>
+              <a:t>” will likely terminate a statement.</a:t>
+            </a:r>
+          </a:p>
+        </p:txBody>
+      </p:sp>
+      <p:sp>
+        <p:nvSpPr>
+          <p:cNvPr id="4" name="Footer Placeholder 3"/>
+          <p:cNvSpPr>
+            <a:spLocks noGrp="1"/>
+          </p:cNvSpPr>
+          <p:nvPr>
+            <p:ph type="ftr" sz="quarter" idx="10"/>
+          </p:nvPr>
+        </p:nvSpPr>
+        <p:spPr/>
+        <p:txBody>
+          <a:bodyPr/>
+          <a:lstStyle/>
+          <a:p>
+            <a:pPr>
+              <a:defRPr/>
+            </a:pPr>
+            <a:r>
+              <a:rPr lang="en-US"/>
+              <a:t>©SoftMoore Consulting</a:t>
+            </a:r>
+          </a:p>
+        </p:txBody>
+      </p:sp>
+      <p:sp>
+        <p:nvSpPr>
+          <p:cNvPr id="5" name="Slide Number Placeholder 4"/>
+          <p:cNvSpPr>
+            <a:spLocks noGrp="1"/>
+          </p:cNvSpPr>
+          <p:nvPr>
+            <p:ph type="sldNum" sz="quarter" idx="11"/>
+          </p:nvPr>
+        </p:nvSpPr>
+        <p:spPr/>
+        <p:txBody>
+          <a:bodyPr/>
+          <a:lstStyle/>
+          <a:p>
+            <a:pPr>
+              <a:defRPr/>
+            </a:pPr>
+            <a:r>
+              <a:rPr lang="en-US"/>
+              <a:t>Slide </a:t>
+            </a:r>
+            <a:fld id="{5F271557-76C1-4390-9827-E45E8E4E29D5}" type="slidenum">
+              <a:rPr lang="en-US" smtClean="0"/>
+              <a:pPr>
+                <a:defRPr/>
+              </a:pPr>
+              <a:t>22</a:t>
+            </a:fld>
+            <a:endParaRPr lang="en-US"/>
+          </a:p>
+        </p:txBody>
+      </p:sp>
+    </p:spTree>
+  </p:cSld>
+  <p:clrMapOvr>
+    <a:masterClrMapping/>
+  </p:clrMapOvr>
+</p:sld>
+</file>
+
+<file path=ppt/slides/slide23.xml><?xml version="1.0" encoding="utf-8"?>
+<p:sld xmlns:a="http://schemas.openxmlformats.org/drawingml/2006/main" xmlns:r="http://schemas.openxmlformats.org/officeDocument/2006/relationships" xmlns:p="http://schemas.openxmlformats.org/presentationml/2006/main">
+  <p:cSld>
+    <p:spTree>
+      <p:nvGrpSpPr>
+        <p:cNvPr id="1" name=""/>
+        <p:cNvGrpSpPr/>
+        <p:nvPr/>
+      </p:nvGrpSpPr>
+      <p:grpSpPr>
+        <a:xfrm>
+          <a:off x="0" y="0"/>
+          <a:ext cx="0" cy="0"/>
+          <a:chOff x="0" y="0"/>
+          <a:chExt cx="0" cy="0"/>
+        </a:xfrm>
+      </p:grpSpPr>
+      <p:sp>
+        <p:nvSpPr>
+          <p:cNvPr id="2" name="Title 1"/>
+          <p:cNvSpPr>
+            <a:spLocks noGrp="1"/>
+          </p:cNvSpPr>
+          <p:nvPr>
+            <p:ph type="title"/>
+          </p:nvPr>
+        </p:nvSpPr>
+        <p:spPr/>
+        <p:txBody>
+          <a:bodyPr/>
+          <a:lstStyle/>
+          <a:p>
+            <a:r>
+              <a:rPr lang="en-US" dirty="0"/>
               <a:t>Example: Additional Recovery Strategies</a:t>
             </a:r>
             <a:br>
@@ -9326,7 +9734,7 @@
             <a:fld id="{5F271557-76C1-4390-9827-E45E8E4E29D5}" type="slidenum">
               <a:rPr lang="en-US" smtClean="0"/>
               <a:pPr/>
-              <a:t>22</a:t>
+              <a:t>23</a:t>
             </a:fld>
             <a:endParaRPr lang="en-US"/>
           </a:p>

</xml_diff>